<commit_message>
Radial spawning and new assets
</commit_message>
<xml_diff>
--- a/Assets/Shapes/Shapes.pptx
+++ b/Assets/Shapes/Shapes.pptx
@@ -7,6 +7,7 @@
   <p:sldIdLst>
     <p:sldId id="256" r:id="rId2"/>
     <p:sldId id="257" r:id="rId3"/>
+    <p:sldId id="258" r:id="rId4"/>
   </p:sldIdLst>
   <p:sldSz cx="12192000" cy="6858000"/>
   <p:notesSz cx="6858000" cy="9144000"/>
@@ -244,7 +245,7 @@
           <a:p>
             <a:fld id="{D80A215A-CE2A-4702-86DB-CE10A173AFE3}" type="datetimeFigureOut">
               <a:rPr lang="en-GB" smtClean="0"/>
-              <a:t>26/02/2019</a:t>
+              <a:t>01/03/2019</a:t>
             </a:fld>
             <a:endParaRPr lang="en-GB"/>
           </a:p>
@@ -414,7 +415,7 @@
           <a:p>
             <a:fld id="{D80A215A-CE2A-4702-86DB-CE10A173AFE3}" type="datetimeFigureOut">
               <a:rPr lang="en-GB" smtClean="0"/>
-              <a:t>26/02/2019</a:t>
+              <a:t>01/03/2019</a:t>
             </a:fld>
             <a:endParaRPr lang="en-GB"/>
           </a:p>
@@ -594,7 +595,7 @@
           <a:p>
             <a:fld id="{D80A215A-CE2A-4702-86DB-CE10A173AFE3}" type="datetimeFigureOut">
               <a:rPr lang="en-GB" smtClean="0"/>
-              <a:t>26/02/2019</a:t>
+              <a:t>01/03/2019</a:t>
             </a:fld>
             <a:endParaRPr lang="en-GB"/>
           </a:p>
@@ -764,7 +765,7 @@
           <a:p>
             <a:fld id="{D80A215A-CE2A-4702-86DB-CE10A173AFE3}" type="datetimeFigureOut">
               <a:rPr lang="en-GB" smtClean="0"/>
-              <a:t>26/02/2019</a:t>
+              <a:t>01/03/2019</a:t>
             </a:fld>
             <a:endParaRPr lang="en-GB"/>
           </a:p>
@@ -1010,7 +1011,7 @@
           <a:p>
             <a:fld id="{D80A215A-CE2A-4702-86DB-CE10A173AFE3}" type="datetimeFigureOut">
               <a:rPr lang="en-GB" smtClean="0"/>
-              <a:t>26/02/2019</a:t>
+              <a:t>01/03/2019</a:t>
             </a:fld>
             <a:endParaRPr lang="en-GB"/>
           </a:p>
@@ -1242,7 +1243,7 @@
           <a:p>
             <a:fld id="{D80A215A-CE2A-4702-86DB-CE10A173AFE3}" type="datetimeFigureOut">
               <a:rPr lang="en-GB" smtClean="0"/>
-              <a:t>26/02/2019</a:t>
+              <a:t>01/03/2019</a:t>
             </a:fld>
             <a:endParaRPr lang="en-GB"/>
           </a:p>
@@ -1609,7 +1610,7 @@
           <a:p>
             <a:fld id="{D80A215A-CE2A-4702-86DB-CE10A173AFE3}" type="datetimeFigureOut">
               <a:rPr lang="en-GB" smtClean="0"/>
-              <a:t>26/02/2019</a:t>
+              <a:t>01/03/2019</a:t>
             </a:fld>
             <a:endParaRPr lang="en-GB"/>
           </a:p>
@@ -1727,7 +1728,7 @@
           <a:p>
             <a:fld id="{D80A215A-CE2A-4702-86DB-CE10A173AFE3}" type="datetimeFigureOut">
               <a:rPr lang="en-GB" smtClean="0"/>
-              <a:t>26/02/2019</a:t>
+              <a:t>01/03/2019</a:t>
             </a:fld>
             <a:endParaRPr lang="en-GB"/>
           </a:p>
@@ -1822,7 +1823,7 @@
           <a:p>
             <a:fld id="{D80A215A-CE2A-4702-86DB-CE10A173AFE3}" type="datetimeFigureOut">
               <a:rPr lang="en-GB" smtClean="0"/>
-              <a:t>26/02/2019</a:t>
+              <a:t>01/03/2019</a:t>
             </a:fld>
             <a:endParaRPr lang="en-GB"/>
           </a:p>
@@ -2099,7 +2100,7 @@
           <a:p>
             <a:fld id="{D80A215A-CE2A-4702-86DB-CE10A173AFE3}" type="datetimeFigureOut">
               <a:rPr lang="en-GB" smtClean="0"/>
-              <a:t>26/02/2019</a:t>
+              <a:t>01/03/2019</a:t>
             </a:fld>
             <a:endParaRPr lang="en-GB"/>
           </a:p>
@@ -2352,7 +2353,7 @@
           <a:p>
             <a:fld id="{D80A215A-CE2A-4702-86DB-CE10A173AFE3}" type="datetimeFigureOut">
               <a:rPr lang="en-GB" smtClean="0"/>
-              <a:t>26/02/2019</a:t>
+              <a:t>01/03/2019</a:t>
             </a:fld>
             <a:endParaRPr lang="en-GB"/>
           </a:p>
@@ -2565,7 +2566,7 @@
           <a:p>
             <a:fld id="{D80A215A-CE2A-4702-86DB-CE10A173AFE3}" type="datetimeFigureOut">
               <a:rPr lang="en-GB" smtClean="0"/>
-              <a:t>26/02/2019</a:t>
+              <a:t>01/03/2019</a:t>
             </a:fld>
             <a:endParaRPr lang="en-GB"/>
           </a:p>
@@ -2986,12 +2987,15 @@
           <a:prstGeom prst="triangle">
             <a:avLst/>
           </a:prstGeom>
-          <a:solidFill>
-            <a:schemeClr val="bg1"/>
-          </a:solidFill>
+          <a:blipFill>
+            <a:blip r:embed="rId2"/>
+            <a:stretch>
+              <a:fillRect/>
+            </a:stretch>
+          </a:blipFill>
           <a:ln w="127000" cap="rnd">
             <a:solidFill>
-              <a:schemeClr val="tx1"/>
+              <a:srgbClr val="4F2721"/>
             </a:solidFill>
             <a:round/>
           </a:ln>
@@ -3035,12 +3039,15 @@
           <a:prstGeom prst="rect">
             <a:avLst/>
           </a:prstGeom>
-          <a:solidFill>
-            <a:schemeClr val="bg1"/>
-          </a:solidFill>
+          <a:blipFill>
+            <a:blip r:embed="rId2"/>
+            <a:stretch>
+              <a:fillRect/>
+            </a:stretch>
+          </a:blipFill>
           <a:ln w="127000">
             <a:solidFill>
-              <a:schemeClr val="tx1"/>
+              <a:srgbClr val="4F2721"/>
             </a:solidFill>
             <a:round/>
           </a:ln>
@@ -3084,12 +3091,15 @@
           <a:prstGeom prst="ellipse">
             <a:avLst/>
           </a:prstGeom>
-          <a:solidFill>
-            <a:schemeClr val="bg1"/>
-          </a:solidFill>
+          <a:blipFill>
+            <a:blip r:embed="rId2"/>
+            <a:stretch>
+              <a:fillRect/>
+            </a:stretch>
+          </a:blipFill>
           <a:ln w="127000">
             <a:solidFill>
-              <a:schemeClr val="tx1"/>
+              <a:srgbClr val="4F2721"/>
             </a:solidFill>
           </a:ln>
         </p:spPr>
@@ -3232,12 +3242,15 @@
           <a:prstGeom prst="hexagon">
             <a:avLst/>
           </a:prstGeom>
-          <a:solidFill>
-            <a:schemeClr val="bg1"/>
-          </a:solidFill>
+          <a:blipFill>
+            <a:blip r:embed="rId2"/>
+            <a:stretch>
+              <a:fillRect/>
+            </a:stretch>
+          </a:blipFill>
           <a:ln w="127000" cap="rnd">
             <a:solidFill>
-              <a:schemeClr val="tx1"/>
+              <a:srgbClr val="4F2721"/>
             </a:solidFill>
             <a:round/>
           </a:ln>
@@ -3267,6 +3280,36 @@
           </a:p>
         </p:txBody>
       </p:sp>
+      <p:pic>
+        <p:nvPicPr>
+          <p:cNvPr id="2" name="Grafik 1"/>
+          <p:cNvPicPr>
+            <a:picLocks noChangeAspect="1"/>
+          </p:cNvPicPr>
+          <p:nvPr/>
+        </p:nvPicPr>
+        <p:blipFill>
+          <a:blip r:embed="rId3" cstate="print">
+            <a:extLst>
+              <a:ext uri="{28A0092B-C50C-407E-A947-70E740481C1C}">
+                <a14:useLocalDpi xmlns:a14="http://schemas.microsoft.com/office/drawing/2010/main" val="0"/>
+              </a:ext>
+            </a:extLst>
+          </a:blip>
+          <a:stretch>
+            <a:fillRect/>
+          </a:stretch>
+        </p:blipFill>
+        <p:spPr>
+          <a:xfrm>
+            <a:off x="6603007" y="4252404"/>
+            <a:ext cx="9583425" cy="6858000"/>
+          </a:xfrm>
+          <a:prstGeom prst="rect">
+            <a:avLst/>
+          </a:prstGeom>
+        </p:spPr>
+      </p:pic>
     </p:spTree>
     <p:extLst>
       <p:ext uri="{BB962C8B-B14F-4D97-AF65-F5344CB8AC3E}">
@@ -3305,7 +3348,7 @@
         </p:nvGrpSpPr>
         <p:grpSpPr>
           <a:xfrm>
-            <a:off x="688311" y="-1105564"/>
+            <a:off x="1105562" y="-812601"/>
             <a:ext cx="10897403" cy="8547104"/>
             <a:chOff x="688311" y="-1105564"/>
             <a:chExt cx="10897403" cy="8547104"/>
@@ -3339,11 +3382,12 @@
               <a:prstGeom prst="rect">
                 <a:avLst/>
               </a:prstGeom>
-              <a:solidFill>
-                <a:schemeClr val="accent6">
-                  <a:lumMod val="50000"/>
-                </a:schemeClr>
-              </a:solidFill>
+              <a:blipFill>
+                <a:blip r:embed="rId2"/>
+                <a:stretch>
+                  <a:fillRect/>
+                </a:stretch>
+              </a:blipFill>
               <a:ln w="127000">
                 <a:solidFill>
                   <a:schemeClr val="tx1"/>
@@ -3391,7 +3435,7 @@
                 <a:avLst/>
               </a:prstGeom>
               <a:solidFill>
-                <a:schemeClr val="bg1"/>
+                <a:schemeClr val="tx1"/>
               </a:solidFill>
               <a:ln>
                 <a:noFill/>
@@ -3451,11 +3495,12 @@
               <a:prstGeom prst="rect">
                 <a:avLst/>
               </a:prstGeom>
-              <a:solidFill>
-                <a:schemeClr val="accent6">
-                  <a:lumMod val="50000"/>
-                </a:schemeClr>
-              </a:solidFill>
+              <a:blipFill>
+                <a:blip r:embed="rId2"/>
+                <a:stretch>
+                  <a:fillRect/>
+                </a:stretch>
+              </a:blipFill>
               <a:ln w="127000">
                 <a:solidFill>
                   <a:schemeClr val="tx1"/>
@@ -3503,7 +3548,7 @@
                 <a:avLst/>
               </a:prstGeom>
               <a:solidFill>
-                <a:schemeClr val="bg1"/>
+                <a:schemeClr val="tx1"/>
               </a:solidFill>
               <a:ln>
                 <a:noFill/>
@@ -3563,11 +3608,12 @@
               <a:prstGeom prst="rect">
                 <a:avLst/>
               </a:prstGeom>
-              <a:solidFill>
-                <a:schemeClr val="accent6">
-                  <a:lumMod val="50000"/>
-                </a:schemeClr>
-              </a:solidFill>
+              <a:blipFill>
+                <a:blip r:embed="rId2"/>
+                <a:stretch>
+                  <a:fillRect/>
+                </a:stretch>
+              </a:blipFill>
               <a:ln w="127000">
                 <a:solidFill>
                   <a:schemeClr val="tx1"/>
@@ -3615,7 +3661,7 @@
                 <a:avLst/>
               </a:prstGeom>
               <a:solidFill>
-                <a:schemeClr val="bg1"/>
+                <a:schemeClr val="tx1"/>
               </a:solidFill>
               <a:ln>
                 <a:noFill/>
@@ -3675,11 +3721,12 @@
               <a:prstGeom prst="rect">
                 <a:avLst/>
               </a:prstGeom>
-              <a:solidFill>
-                <a:schemeClr val="accent6">
-                  <a:lumMod val="50000"/>
-                </a:schemeClr>
-              </a:solidFill>
+              <a:blipFill>
+                <a:blip r:embed="rId2"/>
+                <a:stretch>
+                  <a:fillRect/>
+                </a:stretch>
+              </a:blipFill>
               <a:ln w="127000">
                 <a:solidFill>
                   <a:schemeClr val="tx1"/>
@@ -3727,7 +3774,7 @@
                 <a:avLst/>
               </a:prstGeom>
               <a:solidFill>
-                <a:schemeClr val="bg1"/>
+                <a:schemeClr val="tx1"/>
               </a:solidFill>
               <a:ln>
                 <a:noFill/>
@@ -3775,14 +3822,15 @@
             <a:prstGeom prst="triangle">
               <a:avLst/>
             </a:prstGeom>
-            <a:solidFill>
-              <a:schemeClr val="accent6">
-                <a:lumMod val="50000"/>
-              </a:schemeClr>
-            </a:solidFill>
+            <a:blipFill>
+              <a:blip r:embed="rId3"/>
+              <a:stretch>
+                <a:fillRect/>
+              </a:stretch>
+            </a:blipFill>
             <a:ln w="127000" cap="rnd">
               <a:solidFill>
-                <a:schemeClr val="tx1"/>
+                <a:srgbClr val="4F2721"/>
               </a:solidFill>
               <a:round/>
             </a:ln>
@@ -3826,14 +3874,15 @@
             <a:prstGeom prst="rect">
               <a:avLst/>
             </a:prstGeom>
-            <a:solidFill>
-              <a:schemeClr val="accent6">
-                <a:lumMod val="50000"/>
-              </a:schemeClr>
-            </a:solidFill>
+            <a:blipFill>
+              <a:blip r:embed="rId3"/>
+              <a:stretch>
+                <a:fillRect/>
+              </a:stretch>
+            </a:blipFill>
             <a:ln w="127000">
               <a:solidFill>
-                <a:schemeClr val="tx1"/>
+                <a:srgbClr val="4F2721"/>
               </a:solidFill>
               <a:round/>
             </a:ln>
@@ -3877,14 +3926,15 @@
             <a:prstGeom prst="ellipse">
               <a:avLst/>
             </a:prstGeom>
-            <a:solidFill>
-              <a:schemeClr val="accent6">
-                <a:lumMod val="50000"/>
-              </a:schemeClr>
-            </a:solidFill>
+            <a:blipFill>
+              <a:blip r:embed="rId3"/>
+              <a:stretch>
+                <a:fillRect/>
+              </a:stretch>
+            </a:blipFill>
             <a:ln w="127000">
               <a:solidFill>
-                <a:schemeClr val="tx1"/>
+                <a:srgbClr val="4F2721"/>
               </a:solidFill>
             </a:ln>
           </p:spPr>
@@ -3927,14 +3977,15 @@
             <a:prstGeom prst="hexagon">
               <a:avLst/>
             </a:prstGeom>
-            <a:solidFill>
-              <a:schemeClr val="accent6">
-                <a:lumMod val="50000"/>
-              </a:schemeClr>
-            </a:solidFill>
+            <a:blipFill>
+              <a:blip r:embed="rId3"/>
+              <a:stretch>
+                <a:fillRect/>
+              </a:stretch>
+            </a:blipFill>
             <a:ln w="127000" cap="rnd">
               <a:solidFill>
-                <a:schemeClr val="tx1"/>
+                <a:srgbClr val="4F2721"/>
               </a:solidFill>
               <a:round/>
             </a:ln>
@@ -3969,6 +4020,703 @@
     <p:extLst>
       <p:ext uri="{BB962C8B-B14F-4D97-AF65-F5344CB8AC3E}">
         <p14:creationId xmlns:p14="http://schemas.microsoft.com/office/powerpoint/2010/main" val="392305352"/>
+      </p:ext>
+    </p:extLst>
+  </p:cSld>
+  <p:clrMapOvr>
+    <a:masterClrMapping/>
+  </p:clrMapOvr>
+</p:sld>
+</file>
+
+<file path=ppt/slides/slide3.xml><?xml version="1.0" encoding="utf-8"?>
+<p:sld xmlns:a="http://schemas.openxmlformats.org/drawingml/2006/main" xmlns:r="http://schemas.openxmlformats.org/officeDocument/2006/relationships" xmlns:p="http://schemas.openxmlformats.org/presentationml/2006/main">
+  <p:cSld>
+    <p:spTree>
+      <p:nvGrpSpPr>
+        <p:cNvPr id="1" name=""/>
+        <p:cNvGrpSpPr/>
+        <p:nvPr/>
+      </p:nvGrpSpPr>
+      <p:grpSpPr>
+        <a:xfrm>
+          <a:off x="0" y="0"/>
+          <a:ext cx="0" cy="0"/>
+          <a:chOff x="0" y="0"/>
+          <a:chExt cx="0" cy="0"/>
+        </a:xfrm>
+      </p:grpSpPr>
+      <p:grpSp>
+        <p:nvGrpSpPr>
+          <p:cNvPr id="26" name="Gruppieren 25"/>
+          <p:cNvGrpSpPr/>
+          <p:nvPr/>
+        </p:nvGrpSpPr>
+        <p:grpSpPr>
+          <a:xfrm>
+            <a:off x="599534" y="-1105564"/>
+            <a:ext cx="10897403" cy="8547104"/>
+            <a:chOff x="599534" y="-1105564"/>
+            <a:chExt cx="10897403" cy="8547104"/>
+          </a:xfrm>
+        </p:grpSpPr>
+        <p:grpSp>
+          <p:nvGrpSpPr>
+            <p:cNvPr id="5" name="Gruppieren 4"/>
+            <p:cNvGrpSpPr/>
+            <p:nvPr/>
+          </p:nvGrpSpPr>
+          <p:grpSpPr>
+            <a:xfrm rot="-60000">
+              <a:off x="4991222" y="923924"/>
+              <a:ext cx="2160000" cy="2160000"/>
+              <a:chOff x="5181599" y="1343024"/>
+              <a:chExt cx="2160000" cy="2160000"/>
+            </a:xfrm>
+            <a:blipFill>
+              <a:blip r:embed="rId2"/>
+              <a:stretch>
+                <a:fillRect/>
+              </a:stretch>
+            </a:blipFill>
+          </p:grpSpPr>
+          <p:sp>
+            <p:nvSpPr>
+              <p:cNvPr id="19" name="Rechteck 18"/>
+              <p:cNvSpPr/>
+              <p:nvPr/>
+            </p:nvSpPr>
+            <p:spPr>
+              <a:xfrm>
+                <a:off x="5181599" y="1343024"/>
+                <a:ext cx="2160000" cy="2160000"/>
+              </a:xfrm>
+              <a:prstGeom prst="rect">
+                <a:avLst/>
+              </a:prstGeom>
+              <a:grpFill/>
+              <a:ln w="127000">
+                <a:solidFill>
+                  <a:schemeClr val="tx1"/>
+                </a:solidFill>
+                <a:round/>
+              </a:ln>
+            </p:spPr>
+            <p:style>
+              <a:lnRef idx="2">
+                <a:schemeClr val="accent1">
+                  <a:shade val="50000"/>
+                </a:schemeClr>
+              </a:lnRef>
+              <a:fillRef idx="1">
+                <a:schemeClr val="accent1"/>
+              </a:fillRef>
+              <a:effectRef idx="0">
+                <a:schemeClr val="accent1"/>
+              </a:effectRef>
+              <a:fontRef idx="minor">
+                <a:schemeClr val="lt1"/>
+              </a:fontRef>
+            </p:style>
+            <p:txBody>
+              <a:bodyPr rtlCol="0" anchor="ctr"/>
+              <a:lstStyle/>
+              <a:p>
+                <a:pPr algn="ctr"/>
+                <a:endParaRPr lang="en-GB"/>
+              </a:p>
+            </p:txBody>
+          </p:sp>
+          <p:sp>
+            <p:nvSpPr>
+              <p:cNvPr id="20" name="Pfeil nach unten 19"/>
+              <p:cNvSpPr/>
+              <p:nvPr/>
+            </p:nvSpPr>
+            <p:spPr>
+              <a:xfrm rot="10800000">
+                <a:off x="5541599" y="1523024"/>
+                <a:ext cx="1440000" cy="1800000"/>
+              </a:xfrm>
+              <a:prstGeom prst="downArrow">
+                <a:avLst/>
+              </a:prstGeom>
+              <a:solidFill>
+                <a:schemeClr val="tx1"/>
+              </a:solidFill>
+              <a:ln>
+                <a:noFill/>
+              </a:ln>
+            </p:spPr>
+            <p:style>
+              <a:lnRef idx="2">
+                <a:schemeClr val="accent1">
+                  <a:shade val="50000"/>
+                </a:schemeClr>
+              </a:lnRef>
+              <a:fillRef idx="1">
+                <a:schemeClr val="accent1"/>
+              </a:fillRef>
+              <a:effectRef idx="0">
+                <a:schemeClr val="accent1"/>
+              </a:effectRef>
+              <a:fontRef idx="minor">
+                <a:schemeClr val="lt1"/>
+              </a:fontRef>
+            </p:style>
+            <p:txBody>
+              <a:bodyPr rtlCol="0" anchor="ctr"/>
+              <a:lstStyle/>
+              <a:p>
+                <a:pPr algn="ctr"/>
+                <a:endParaRPr lang="en-GB"/>
+              </a:p>
+            </p:txBody>
+          </p:sp>
+        </p:grpSp>
+        <p:grpSp>
+          <p:nvGrpSpPr>
+            <p:cNvPr id="6" name="Gruppieren 5"/>
+            <p:cNvGrpSpPr/>
+            <p:nvPr/>
+          </p:nvGrpSpPr>
+          <p:grpSpPr>
+            <a:xfrm rot="120000">
+              <a:off x="4991222" y="3276599"/>
+              <a:ext cx="2160000" cy="2160000"/>
+              <a:chOff x="5181599" y="3695699"/>
+              <a:chExt cx="2160000" cy="2160000"/>
+            </a:xfrm>
+            <a:blipFill>
+              <a:blip r:embed="rId2"/>
+              <a:stretch>
+                <a:fillRect/>
+              </a:stretch>
+            </a:blipFill>
+          </p:grpSpPr>
+          <p:sp>
+            <p:nvSpPr>
+              <p:cNvPr id="17" name="Rechteck 16"/>
+              <p:cNvSpPr/>
+              <p:nvPr/>
+            </p:nvSpPr>
+            <p:spPr>
+              <a:xfrm>
+                <a:off x="5181599" y="3695699"/>
+                <a:ext cx="2160000" cy="2160000"/>
+              </a:xfrm>
+              <a:prstGeom prst="rect">
+                <a:avLst/>
+              </a:prstGeom>
+              <a:grpFill/>
+              <a:ln w="127000">
+                <a:solidFill>
+                  <a:schemeClr val="tx1"/>
+                </a:solidFill>
+                <a:round/>
+              </a:ln>
+            </p:spPr>
+            <p:style>
+              <a:lnRef idx="2">
+                <a:schemeClr val="accent1">
+                  <a:shade val="50000"/>
+                </a:schemeClr>
+              </a:lnRef>
+              <a:fillRef idx="1">
+                <a:schemeClr val="accent1"/>
+              </a:fillRef>
+              <a:effectRef idx="0">
+                <a:schemeClr val="accent1"/>
+              </a:effectRef>
+              <a:fontRef idx="minor">
+                <a:schemeClr val="lt1"/>
+              </a:fontRef>
+            </p:style>
+            <p:txBody>
+              <a:bodyPr rtlCol="0" anchor="ctr"/>
+              <a:lstStyle/>
+              <a:p>
+                <a:pPr algn="ctr"/>
+                <a:endParaRPr lang="en-GB"/>
+              </a:p>
+            </p:txBody>
+          </p:sp>
+          <p:sp>
+            <p:nvSpPr>
+              <p:cNvPr id="18" name="Pfeil nach unten 17"/>
+              <p:cNvSpPr/>
+              <p:nvPr/>
+            </p:nvSpPr>
+            <p:spPr>
+              <a:xfrm>
+                <a:off x="5541599" y="3875699"/>
+                <a:ext cx="1440000" cy="1800000"/>
+              </a:xfrm>
+              <a:prstGeom prst="downArrow">
+                <a:avLst/>
+              </a:prstGeom>
+              <a:solidFill>
+                <a:schemeClr val="tx1"/>
+              </a:solidFill>
+              <a:ln>
+                <a:noFill/>
+              </a:ln>
+            </p:spPr>
+            <p:style>
+              <a:lnRef idx="2">
+                <a:schemeClr val="accent1">
+                  <a:shade val="50000"/>
+                </a:schemeClr>
+              </a:lnRef>
+              <a:fillRef idx="1">
+                <a:schemeClr val="accent1"/>
+              </a:fillRef>
+              <a:effectRef idx="0">
+                <a:schemeClr val="accent1"/>
+              </a:effectRef>
+              <a:fontRef idx="minor">
+                <a:schemeClr val="lt1"/>
+              </a:fontRef>
+            </p:style>
+            <p:txBody>
+              <a:bodyPr rtlCol="0" anchor="ctr"/>
+              <a:lstStyle/>
+              <a:p>
+                <a:pPr algn="ctr"/>
+                <a:endParaRPr lang="en-GB"/>
+              </a:p>
+            </p:txBody>
+          </p:sp>
+        </p:grpSp>
+        <p:grpSp>
+          <p:nvGrpSpPr>
+            <p:cNvPr id="7" name="Gruppieren 6"/>
+            <p:cNvGrpSpPr/>
+            <p:nvPr/>
+          </p:nvGrpSpPr>
+          <p:grpSpPr>
+            <a:xfrm rot="-120000">
+              <a:off x="7353422" y="3276599"/>
+              <a:ext cx="2160000" cy="2160000"/>
+              <a:chOff x="7543799" y="3695699"/>
+              <a:chExt cx="2160000" cy="2160000"/>
+            </a:xfrm>
+            <a:blipFill>
+              <a:blip r:embed="rId2"/>
+              <a:stretch>
+                <a:fillRect/>
+              </a:stretch>
+            </a:blipFill>
+          </p:grpSpPr>
+          <p:sp>
+            <p:nvSpPr>
+              <p:cNvPr id="15" name="Rechteck 14"/>
+              <p:cNvSpPr/>
+              <p:nvPr/>
+            </p:nvSpPr>
+            <p:spPr>
+              <a:xfrm>
+                <a:off x="7543799" y="3695699"/>
+                <a:ext cx="2160000" cy="2160000"/>
+              </a:xfrm>
+              <a:prstGeom prst="rect">
+                <a:avLst/>
+              </a:prstGeom>
+              <a:grpFill/>
+              <a:ln w="127000">
+                <a:solidFill>
+                  <a:schemeClr val="tx1"/>
+                </a:solidFill>
+                <a:round/>
+              </a:ln>
+            </p:spPr>
+            <p:style>
+              <a:lnRef idx="2">
+                <a:schemeClr val="accent1">
+                  <a:shade val="50000"/>
+                </a:schemeClr>
+              </a:lnRef>
+              <a:fillRef idx="1">
+                <a:schemeClr val="accent1"/>
+              </a:fillRef>
+              <a:effectRef idx="0">
+                <a:schemeClr val="accent1"/>
+              </a:effectRef>
+              <a:fontRef idx="minor">
+                <a:schemeClr val="lt1"/>
+              </a:fontRef>
+            </p:style>
+            <p:txBody>
+              <a:bodyPr rtlCol="0" anchor="ctr"/>
+              <a:lstStyle/>
+              <a:p>
+                <a:pPr algn="ctr"/>
+                <a:endParaRPr lang="en-GB"/>
+              </a:p>
+            </p:txBody>
+          </p:sp>
+          <p:sp>
+            <p:nvSpPr>
+              <p:cNvPr id="16" name="Pfeil nach unten 15"/>
+              <p:cNvSpPr/>
+              <p:nvPr/>
+            </p:nvSpPr>
+            <p:spPr>
+              <a:xfrm rot="16200000">
+                <a:off x="7903799" y="3875699"/>
+                <a:ext cx="1440000" cy="1800000"/>
+              </a:xfrm>
+              <a:prstGeom prst="downArrow">
+                <a:avLst/>
+              </a:prstGeom>
+              <a:solidFill>
+                <a:schemeClr val="tx1"/>
+              </a:solidFill>
+              <a:ln>
+                <a:noFill/>
+              </a:ln>
+            </p:spPr>
+            <p:style>
+              <a:lnRef idx="2">
+                <a:schemeClr val="accent1">
+                  <a:shade val="50000"/>
+                </a:schemeClr>
+              </a:lnRef>
+              <a:fillRef idx="1">
+                <a:schemeClr val="accent1"/>
+              </a:fillRef>
+              <a:effectRef idx="0">
+                <a:schemeClr val="accent1"/>
+              </a:effectRef>
+              <a:fontRef idx="minor">
+                <a:schemeClr val="lt1"/>
+              </a:fontRef>
+            </p:style>
+            <p:txBody>
+              <a:bodyPr rtlCol="0" anchor="ctr"/>
+              <a:lstStyle/>
+              <a:p>
+                <a:pPr algn="ctr"/>
+                <a:endParaRPr lang="en-GB"/>
+              </a:p>
+            </p:txBody>
+          </p:sp>
+        </p:grpSp>
+        <p:grpSp>
+          <p:nvGrpSpPr>
+            <p:cNvPr id="8" name="Gruppieren 7"/>
+            <p:cNvGrpSpPr/>
+            <p:nvPr/>
+          </p:nvGrpSpPr>
+          <p:grpSpPr>
+            <a:xfrm rot="-60000">
+              <a:off x="2629022" y="3276599"/>
+              <a:ext cx="2160000" cy="2160000"/>
+              <a:chOff x="2819399" y="3695699"/>
+              <a:chExt cx="2160000" cy="2160000"/>
+            </a:xfrm>
+            <a:blipFill>
+              <a:blip r:embed="rId2"/>
+              <a:stretch>
+                <a:fillRect/>
+              </a:stretch>
+            </a:blipFill>
+          </p:grpSpPr>
+          <p:sp>
+            <p:nvSpPr>
+              <p:cNvPr id="13" name="Rechteck 12"/>
+              <p:cNvSpPr/>
+              <p:nvPr/>
+            </p:nvSpPr>
+            <p:spPr>
+              <a:xfrm>
+                <a:off x="2819399" y="3695699"/>
+                <a:ext cx="2160000" cy="2160000"/>
+              </a:xfrm>
+              <a:prstGeom prst="rect">
+                <a:avLst/>
+              </a:prstGeom>
+              <a:grpFill/>
+              <a:ln w="127000">
+                <a:solidFill>
+                  <a:schemeClr val="tx1"/>
+                </a:solidFill>
+                <a:round/>
+              </a:ln>
+            </p:spPr>
+            <p:style>
+              <a:lnRef idx="2">
+                <a:schemeClr val="accent1">
+                  <a:shade val="50000"/>
+                </a:schemeClr>
+              </a:lnRef>
+              <a:fillRef idx="1">
+                <a:schemeClr val="accent1"/>
+              </a:fillRef>
+              <a:effectRef idx="0">
+                <a:schemeClr val="accent1"/>
+              </a:effectRef>
+              <a:fontRef idx="minor">
+                <a:schemeClr val="lt1"/>
+              </a:fontRef>
+            </p:style>
+            <p:txBody>
+              <a:bodyPr rtlCol="0" anchor="ctr"/>
+              <a:lstStyle/>
+              <a:p>
+                <a:pPr algn="ctr"/>
+                <a:endParaRPr lang="en-GB"/>
+              </a:p>
+            </p:txBody>
+          </p:sp>
+          <p:sp>
+            <p:nvSpPr>
+              <p:cNvPr id="14" name="Pfeil nach unten 13"/>
+              <p:cNvSpPr/>
+              <p:nvPr/>
+            </p:nvSpPr>
+            <p:spPr>
+              <a:xfrm rot="5400000">
+                <a:off x="3179399" y="3875698"/>
+                <a:ext cx="1440000" cy="1800000"/>
+              </a:xfrm>
+              <a:prstGeom prst="downArrow">
+                <a:avLst/>
+              </a:prstGeom>
+              <a:solidFill>
+                <a:schemeClr val="tx1"/>
+              </a:solidFill>
+              <a:ln>
+                <a:noFill/>
+              </a:ln>
+            </p:spPr>
+            <p:style>
+              <a:lnRef idx="2">
+                <a:schemeClr val="accent1">
+                  <a:shade val="50000"/>
+                </a:schemeClr>
+              </a:lnRef>
+              <a:fillRef idx="1">
+                <a:schemeClr val="accent1"/>
+              </a:fillRef>
+              <a:effectRef idx="0">
+                <a:schemeClr val="accent1"/>
+              </a:effectRef>
+              <a:fontRef idx="minor">
+                <a:schemeClr val="lt1"/>
+              </a:fontRef>
+            </p:style>
+            <p:txBody>
+              <a:bodyPr rtlCol="0" anchor="ctr"/>
+              <a:lstStyle/>
+              <a:p>
+                <a:pPr algn="ctr"/>
+                <a:endParaRPr lang="en-GB"/>
+              </a:p>
+            </p:txBody>
+          </p:sp>
+        </p:grpSp>
+        <p:sp>
+          <p:nvSpPr>
+            <p:cNvPr id="23" name="Wolke 22"/>
+            <p:cNvSpPr/>
+            <p:nvPr/>
+          </p:nvSpPr>
+          <p:spPr>
+            <a:xfrm rot="13804492">
+              <a:off x="599534" y="3458403"/>
+              <a:ext cx="1800000" cy="1800000"/>
+            </a:xfrm>
+            <a:prstGeom prst="cloud">
+              <a:avLst/>
+            </a:prstGeom>
+            <a:solidFill>
+              <a:srgbClr val="FF0000"/>
+            </a:solidFill>
+            <a:ln w="127000" cap="rnd">
+              <a:solidFill>
+                <a:srgbClr val="C00000"/>
+              </a:solidFill>
+              <a:round/>
+            </a:ln>
+          </p:spPr>
+          <p:style>
+            <a:lnRef idx="2">
+              <a:schemeClr val="accent1">
+                <a:shade val="50000"/>
+              </a:schemeClr>
+            </a:lnRef>
+            <a:fillRef idx="1">
+              <a:schemeClr val="accent1"/>
+            </a:fillRef>
+            <a:effectRef idx="0">
+              <a:schemeClr val="accent1"/>
+            </a:effectRef>
+            <a:fontRef idx="minor">
+              <a:schemeClr val="lt1"/>
+            </a:fontRef>
+          </p:style>
+          <p:txBody>
+            <a:bodyPr rtlCol="0" anchor="ctr"/>
+            <a:lstStyle/>
+            <a:p>
+              <a:pPr algn="ctr"/>
+              <a:endParaRPr lang="en-GB"/>
+            </a:p>
+          </p:txBody>
+        </p:sp>
+        <p:sp>
+          <p:nvSpPr>
+            <p:cNvPr id="22" name="Wolke 21"/>
+            <p:cNvSpPr/>
+            <p:nvPr/>
+          </p:nvSpPr>
+          <p:spPr>
+            <a:xfrm rot="17555454">
+              <a:off x="5171222" y="-1105564"/>
+              <a:ext cx="1800000" cy="1800000"/>
+            </a:xfrm>
+            <a:prstGeom prst="cloud">
+              <a:avLst/>
+            </a:prstGeom>
+            <a:solidFill>
+              <a:srgbClr val="92D050"/>
+            </a:solidFill>
+            <a:ln w="127000" cap="rnd">
+              <a:solidFill>
+                <a:srgbClr val="00B050"/>
+              </a:solidFill>
+              <a:round/>
+            </a:ln>
+          </p:spPr>
+          <p:style>
+            <a:lnRef idx="2">
+              <a:schemeClr val="accent1">
+                <a:shade val="50000"/>
+              </a:schemeClr>
+            </a:lnRef>
+            <a:fillRef idx="1">
+              <a:schemeClr val="accent1"/>
+            </a:fillRef>
+            <a:effectRef idx="0">
+              <a:schemeClr val="accent1"/>
+            </a:effectRef>
+            <a:fontRef idx="minor">
+              <a:schemeClr val="lt1"/>
+            </a:fontRef>
+          </p:style>
+          <p:txBody>
+            <a:bodyPr rtlCol="0" anchor="ctr"/>
+            <a:lstStyle/>
+            <a:p>
+              <a:pPr algn="ctr"/>
+              <a:endParaRPr lang="en-GB"/>
+            </a:p>
+          </p:txBody>
+        </p:sp>
+        <p:sp>
+          <p:nvSpPr>
+            <p:cNvPr id="21" name="Wolke 20"/>
+            <p:cNvSpPr/>
+            <p:nvPr/>
+          </p:nvSpPr>
+          <p:spPr>
+            <a:xfrm>
+              <a:off x="9696937" y="3456598"/>
+              <a:ext cx="1800000" cy="1800000"/>
+            </a:xfrm>
+            <a:prstGeom prst="cloud">
+              <a:avLst/>
+            </a:prstGeom>
+            <a:solidFill>
+              <a:srgbClr val="0070C0"/>
+            </a:solidFill>
+            <a:ln w="127000" cap="rnd">
+              <a:solidFill>
+                <a:srgbClr val="002060"/>
+              </a:solidFill>
+              <a:round/>
+            </a:ln>
+          </p:spPr>
+          <p:style>
+            <a:lnRef idx="2">
+              <a:schemeClr val="accent1">
+                <a:shade val="50000"/>
+              </a:schemeClr>
+            </a:lnRef>
+            <a:fillRef idx="1">
+              <a:schemeClr val="accent1"/>
+            </a:fillRef>
+            <a:effectRef idx="0">
+              <a:schemeClr val="accent1"/>
+            </a:effectRef>
+            <a:fontRef idx="minor">
+              <a:schemeClr val="lt1"/>
+            </a:fontRef>
+          </p:style>
+          <p:txBody>
+            <a:bodyPr rtlCol="0" anchor="ctr"/>
+            <a:lstStyle/>
+            <a:p>
+              <a:pPr algn="ctr"/>
+              <a:endParaRPr lang="en-GB"/>
+            </a:p>
+          </p:txBody>
+        </p:sp>
+        <p:sp>
+          <p:nvSpPr>
+            <p:cNvPr id="24" name="Wolke 23"/>
+            <p:cNvSpPr/>
+            <p:nvPr/>
+          </p:nvSpPr>
+          <p:spPr>
+            <a:xfrm rot="6143620">
+              <a:off x="5171222" y="5641540"/>
+              <a:ext cx="1800000" cy="1800000"/>
+            </a:xfrm>
+            <a:prstGeom prst="cloud">
+              <a:avLst/>
+            </a:prstGeom>
+            <a:solidFill>
+              <a:srgbClr val="FFFF00"/>
+            </a:solidFill>
+            <a:ln w="127000" cap="rnd">
+              <a:solidFill>
+                <a:srgbClr val="FFC000"/>
+              </a:solidFill>
+              <a:round/>
+            </a:ln>
+          </p:spPr>
+          <p:style>
+            <a:lnRef idx="2">
+              <a:schemeClr val="accent1">
+                <a:shade val="50000"/>
+              </a:schemeClr>
+            </a:lnRef>
+            <a:fillRef idx="1">
+              <a:schemeClr val="accent1"/>
+            </a:fillRef>
+            <a:effectRef idx="0">
+              <a:schemeClr val="accent1"/>
+            </a:effectRef>
+            <a:fontRef idx="minor">
+              <a:schemeClr val="lt1"/>
+            </a:fontRef>
+          </p:style>
+          <p:txBody>
+            <a:bodyPr rtlCol="0" anchor="ctr"/>
+            <a:lstStyle/>
+            <a:p>
+              <a:pPr algn="ctr"/>
+              <a:endParaRPr lang="en-GB"/>
+            </a:p>
+          </p:txBody>
+        </p:sp>
+      </p:grpSp>
+    </p:spTree>
+    <p:extLst>
+      <p:ext uri="{BB962C8B-B14F-4D97-AF65-F5344CB8AC3E}">
+        <p14:creationId xmlns:p14="http://schemas.microsoft.com/office/powerpoint/2010/main" val="1129663271"/>
       </p:ext>
     </p:extLst>
   </p:cSld>

</xml_diff>